<commit_message>
Update 2. Árboles de decisión.pptx
</commit_message>
<xml_diff>
--- a/Fundamentos de Machine Learning/2. Árboles de decisión.pptx
+++ b/Fundamentos de Machine Learning/2. Árboles de decisión.pptx
@@ -295,7 +295,7 @@
       </p15:sldGuideLst>
     </p:ext>
     <p:ext uri="http://customooxmlschemas.google.com/">
-      <go:slidesCustomData xmlns:go="http://customooxmlschemas.google.com/" xmlns:p15="http://schemas.microsoft.com/office/powerpoint/2012/main" xmlns:p14="http://schemas.microsoft.com/office/powerpoint/2010/main" xmlns:com="http://schemas.openxmlformats.org/drawingml/2006/compatibility" xmlns:pvml="urn:schemas-microsoft-com:office:powerpoint" xmlns:v="urn:schemas-microsoft-com:vml" xmlns:o="urn:schemas-microsoft-com:office:office" xmlns:dgm="http://schemas.openxmlformats.org/drawingml/2006/diagram" xmlns:c="http://schemas.openxmlformats.org/drawingml/2006/chart" xmlns:mv="urn:schemas-microsoft-com:mac:vml" xmlns:mc="http://schemas.openxmlformats.org/markup-compatibility/2006" xmlns="" r:id="rId49" roundtripDataSignature="AMtx7mhOwjG65VCCl/v4qwULABoIICf2Yg=="/>
+      <go:slidesCustomData xmlns="" xmlns:mc="http://schemas.openxmlformats.org/markup-compatibility/2006" xmlns:mv="urn:schemas-microsoft-com:mac:vml" xmlns:c="http://schemas.openxmlformats.org/drawingml/2006/chart" xmlns:dgm="http://schemas.openxmlformats.org/drawingml/2006/diagram" xmlns:o="urn:schemas-microsoft-com:office:office" xmlns:v="urn:schemas-microsoft-com:vml" xmlns:pvml="urn:schemas-microsoft-com:office:powerpoint" xmlns:com="http://schemas.openxmlformats.org/drawingml/2006/compatibility" xmlns:p14="http://schemas.microsoft.com/office/powerpoint/2010/main" xmlns:p15="http://schemas.microsoft.com/office/powerpoint/2012/main" xmlns:go="http://customooxmlschemas.google.com/" r:id="rId49" roundtripDataSignature="AMtx7mhOwjG65VCCl/v4qwULABoIICf2Yg=="/>
     </p:ext>
   </p:extLst>
 </p:presentation>
@@ -16208,7 +16208,7 @@
         </p:blipFill>
         <p:spPr>
           <a:xfrm>
-            <a:off x="366675" y="624250"/>
+            <a:off x="366675" y="709309"/>
             <a:ext cx="7363674" cy="4239425"/>
           </a:xfrm>
           <a:prstGeom prst="rect">
@@ -16228,7 +16228,7 @@
         </p:nvSpPr>
         <p:spPr>
           <a:xfrm>
-            <a:off x="7056226" y="595275"/>
+            <a:off x="7056226" y="673246"/>
             <a:ext cx="783000" cy="4349700"/>
           </a:xfrm>
           <a:prstGeom prst="rect">
@@ -16288,7 +16288,7 @@
         </p:nvSpPr>
         <p:spPr>
           <a:xfrm>
-            <a:off x="1533019" y="604425"/>
+            <a:off x="1533019" y="682396"/>
             <a:ext cx="5470500" cy="4349700"/>
           </a:xfrm>
           <a:prstGeom prst="rect">
@@ -16348,7 +16348,7 @@
         </p:nvSpPr>
         <p:spPr>
           <a:xfrm>
-            <a:off x="1424142" y="181048"/>
+            <a:off x="1424142" y="358378"/>
             <a:ext cx="2457900" cy="454200"/>
           </a:xfrm>
           <a:prstGeom prst="rect">
@@ -16385,7 +16385,7 @@
             <a:r>
               <a:rPr lang="es" sz="1400" b="1" i="0" u="none" strike="noStrike" cap="none" dirty="0">
                 <a:solidFill>
-                  <a:schemeClr val="bg1"/>
+                  <a:srgbClr val="0070C0"/>
                 </a:solidFill>
                 <a:latin typeface="Arial"/>
                 <a:ea typeface="Arial"/>
@@ -16396,7 +16396,7 @@
             </a:r>
             <a:endParaRPr sz="1400" b="1" i="0" u="none" strike="noStrike" cap="none" dirty="0">
               <a:solidFill>
-                <a:schemeClr val="bg1"/>
+                <a:srgbClr val="0070C0"/>
               </a:solidFill>
               <a:latin typeface="Arial"/>
               <a:ea typeface="Arial"/>
@@ -16414,7 +16414,7 @@
         </p:nvSpPr>
         <p:spPr>
           <a:xfrm>
-            <a:off x="7003520" y="192046"/>
+            <a:off x="6490908" y="358378"/>
             <a:ext cx="2457900" cy="454200"/>
           </a:xfrm>
           <a:prstGeom prst="rect">
@@ -16449,7 +16449,7 @@
               <a:buNone/>
             </a:pPr>
             <a:r>
-              <a:rPr lang="es" sz="1400" b="1" i="0" u="none" strike="noStrike" cap="none">
+              <a:rPr lang="es" b="1" i="0" u="none" strike="noStrike" cap="none" dirty="0">
                 <a:solidFill>
                   <a:srgbClr val="38761D"/>
                 </a:solidFill>
@@ -16460,7 +16460,7 @@
               </a:rPr>
               <a:t>Variable dependiente</a:t>
             </a:r>
-            <a:endParaRPr sz="1400" b="1" i="0" u="none" strike="noStrike" cap="none">
+            <a:endParaRPr b="1" i="0" u="none" strike="noStrike" cap="none" dirty="0">
               <a:solidFill>
                 <a:srgbClr val="38761D"/>
               </a:solidFill>
@@ -16497,9 +16497,81 @@
           <a:chExt cx="0" cy="0"/>
         </a:xfrm>
       </p:grpSpPr>
+      <p:sp>
+        <p:nvSpPr>
+          <p:cNvPr id="257" name="Google Shape;257;p11"/>
+          <p:cNvSpPr txBox="1"/>
+          <p:nvPr/>
+        </p:nvSpPr>
+        <p:spPr>
+          <a:xfrm>
+            <a:off x="1424142" y="341301"/>
+            <a:ext cx="3835800" cy="454200"/>
+          </a:xfrm>
+          <a:prstGeom prst="rect">
+            <a:avLst/>
+          </a:prstGeom>
+          <a:noFill/>
+          <a:ln>
+            <a:noFill/>
+          </a:ln>
+        </p:spPr>
+        <p:txBody>
+          <a:bodyPr spcFirstLastPara="1" wrap="square" lIns="91425" tIns="91425" rIns="91425" bIns="91425" anchor="t" anchorCtr="0">
+            <a:noAutofit/>
+          </a:bodyPr>
+          <a:lstStyle/>
+          <a:p>
+            <a:pPr marL="0" marR="0" lvl="0" indent="0" algn="l" rtl="0">
+              <a:lnSpc>
+                <a:spcPct val="100000"/>
+              </a:lnSpc>
+              <a:spcBef>
+                <a:spcPts val="0"/>
+              </a:spcBef>
+              <a:spcAft>
+                <a:spcPts val="0"/>
+              </a:spcAft>
+              <a:buClr>
+                <a:srgbClr val="000000"/>
+              </a:buClr>
+              <a:buSzPts val="1400"/>
+              <a:buFont typeface="Arial"/>
+              <a:buNone/>
+            </a:pPr>
+            <a:r>
+              <a:rPr lang="es" sz="1400" b="1" i="0" u="none" strike="noStrike" cap="none" dirty="0">
+                <a:solidFill>
+                  <a:srgbClr val="0070C0"/>
+                </a:solidFill>
+                <a:latin typeface="Arial"/>
+                <a:ea typeface="Arial"/>
+                <a:cs typeface="Arial"/>
+                <a:sym typeface="Arial"/>
+              </a:rPr>
+              <a:t>¿Con qué pregunta iniciamos el árbol?</a:t>
+            </a:r>
+            <a:endParaRPr sz="1400" b="1" i="0" u="none" strike="noStrike" cap="none" dirty="0">
+              <a:solidFill>
+                <a:srgbClr val="0070C0"/>
+              </a:solidFill>
+              <a:latin typeface="Arial"/>
+              <a:ea typeface="Arial"/>
+              <a:cs typeface="Arial"/>
+              <a:sym typeface="Arial"/>
+            </a:endParaRPr>
+          </a:p>
+        </p:txBody>
+      </p:sp>
       <p:pic>
         <p:nvPicPr>
-          <p:cNvPr id="254" name="Google Shape;254;p11"/>
+          <p:cNvPr id="6" name="Google Shape;245;p10">
+            <a:extLst>
+              <a:ext uri="{FF2B5EF4-FFF2-40B4-BE49-F238E27FC236}">
+                <a16:creationId xmlns:a16="http://schemas.microsoft.com/office/drawing/2014/main" id="{AA7930BD-A7D9-41FC-A5B0-C60D57AA70C5}"/>
+              </a:ext>
+            </a:extLst>
+          </p:cNvPr>
           <p:cNvPicPr preferRelativeResize="0"/>
           <p:nvPr/>
         </p:nvPicPr>
@@ -16512,7 +16584,7 @@
         </p:blipFill>
         <p:spPr>
           <a:xfrm>
-            <a:off x="366675" y="624250"/>
+            <a:off x="366675" y="709309"/>
             <a:ext cx="7363674" cy="4239425"/>
           </a:xfrm>
           <a:prstGeom prst="rect">
@@ -16526,13 +16598,19 @@
       </p:pic>
       <p:sp>
         <p:nvSpPr>
-          <p:cNvPr id="255" name="Google Shape;255;p11"/>
+          <p:cNvPr id="7" name="Google Shape;246;p10">
+            <a:extLst>
+              <a:ext uri="{FF2B5EF4-FFF2-40B4-BE49-F238E27FC236}">
+                <a16:creationId xmlns:a16="http://schemas.microsoft.com/office/drawing/2014/main" id="{61FCB638-FD4B-44F6-99E8-EB1B225D6F7B}"/>
+              </a:ext>
+            </a:extLst>
+          </p:cNvPr>
           <p:cNvSpPr/>
           <p:nvPr/>
         </p:nvSpPr>
         <p:spPr>
           <a:xfrm>
-            <a:off x="7056226" y="595275"/>
+            <a:off x="7056226" y="673246"/>
             <a:ext cx="783000" cy="4349700"/>
           </a:xfrm>
           <a:prstGeom prst="rect">
@@ -16572,7 +16650,7 @@
               <a:buFont typeface="Arial"/>
               <a:buNone/>
             </a:pPr>
-            <a:endParaRPr sz="1400" b="0" i="0" u="none" strike="noStrike" cap="none">
+            <a:endParaRPr sz="1400" b="0" i="0" u="none" strike="noStrike" cap="none" dirty="0">
               <a:solidFill>
                 <a:srgbClr val="000000"/>
               </a:solidFill>
@@ -16586,13 +16664,19 @@
       </p:sp>
       <p:sp>
         <p:nvSpPr>
-          <p:cNvPr id="256" name="Google Shape;256;p11"/>
+          <p:cNvPr id="8" name="Google Shape;247;p10">
+            <a:extLst>
+              <a:ext uri="{FF2B5EF4-FFF2-40B4-BE49-F238E27FC236}">
+                <a16:creationId xmlns:a16="http://schemas.microsoft.com/office/drawing/2014/main" id="{9D61434F-8E25-437F-A77F-74D77DB3BFD5}"/>
+              </a:ext>
+            </a:extLst>
+          </p:cNvPr>
           <p:cNvSpPr/>
           <p:nvPr/>
         </p:nvSpPr>
         <p:spPr>
           <a:xfrm>
-            <a:off x="1533019" y="604425"/>
+            <a:off x="1533019" y="682396"/>
             <a:ext cx="5470500" cy="4349700"/>
           </a:xfrm>
           <a:prstGeom prst="rect">
@@ -16635,72 +16719,6 @@
             <a:endParaRPr sz="1400" b="0" i="0" u="none" strike="noStrike" cap="none">
               <a:solidFill>
                 <a:srgbClr val="000000"/>
-              </a:solidFill>
-              <a:latin typeface="Arial"/>
-              <a:ea typeface="Arial"/>
-              <a:cs typeface="Arial"/>
-              <a:sym typeface="Arial"/>
-            </a:endParaRPr>
-          </a:p>
-        </p:txBody>
-      </p:sp>
-      <p:sp>
-        <p:nvSpPr>
-          <p:cNvPr id="257" name="Google Shape;257;p11"/>
-          <p:cNvSpPr txBox="1"/>
-          <p:nvPr/>
-        </p:nvSpPr>
-        <p:spPr>
-          <a:xfrm>
-            <a:off x="1436501" y="135738"/>
-            <a:ext cx="3835800" cy="454200"/>
-          </a:xfrm>
-          <a:prstGeom prst="rect">
-            <a:avLst/>
-          </a:prstGeom>
-          <a:noFill/>
-          <a:ln>
-            <a:noFill/>
-          </a:ln>
-        </p:spPr>
-        <p:txBody>
-          <a:bodyPr spcFirstLastPara="1" wrap="square" lIns="91425" tIns="91425" rIns="91425" bIns="91425" anchor="t" anchorCtr="0">
-            <a:noAutofit/>
-          </a:bodyPr>
-          <a:lstStyle/>
-          <a:p>
-            <a:pPr marL="0" marR="0" lvl="0" indent="0" algn="l" rtl="0">
-              <a:lnSpc>
-                <a:spcPct val="100000"/>
-              </a:lnSpc>
-              <a:spcBef>
-                <a:spcPts val="0"/>
-              </a:spcBef>
-              <a:spcAft>
-                <a:spcPts val="0"/>
-              </a:spcAft>
-              <a:buClr>
-                <a:srgbClr val="000000"/>
-              </a:buClr>
-              <a:buSzPts val="1400"/>
-              <a:buFont typeface="Arial"/>
-              <a:buNone/>
-            </a:pPr>
-            <a:r>
-              <a:rPr lang="es" sz="1400" b="1" i="0" u="none" strike="noStrike" cap="none" dirty="0">
-                <a:solidFill>
-                  <a:schemeClr val="bg1"/>
-                </a:solidFill>
-                <a:latin typeface="Arial"/>
-                <a:ea typeface="Arial"/>
-                <a:cs typeface="Arial"/>
-                <a:sym typeface="Arial"/>
-              </a:rPr>
-              <a:t>¿Con qué pregunta iniciamos el árbol?</a:t>
-            </a:r>
-            <a:endParaRPr sz="1400" b="1" i="0" u="none" strike="noStrike" cap="none" dirty="0">
-              <a:solidFill>
-                <a:schemeClr val="bg1"/>
               </a:solidFill>
               <a:latin typeface="Arial"/>
               <a:ea typeface="Arial"/>
@@ -34137,16 +34155,7 @@
                 </a:uFill>
                 <a:hlinkClick r:id="rId4"/>
               </a:rPr>
-              <a:t>https://www.youtube.com/watch?v=7VeUPuFGJH</a:t>
-            </a:r>
-            <a:r>
-              <a:rPr lang="es" dirty="0">
-                <a:uFill>
-                  <a:noFill/>
-                </a:uFill>
-                <a:hlinkClick r:id="rId4"/>
-              </a:rPr>
-              <a:t>k</a:t>
+              <a:t>https://www.youtube.com/watch?v=7VeUPuFGJHk</a:t>
             </a:r>
             <a:endParaRPr dirty="0"/>
           </a:p>

</xml_diff>